<commit_message>
Update the presentation files
</commit_message>
<xml_diff>
--- a/presentation.pptx
+++ b/presentation.pptx
@@ -275,7 +275,7 @@
           <a:p>
             <a:fld id="{CF2D4251-BB2D-49C1-B5CD-24763424ED1F}" type="datetimeFigureOut">
               <a:rPr lang="en-US" smtClean="0"/>
-              <a:t>2020-04-26</a:t>
+              <a:t>2020-05-05</a:t>
             </a:fld>
             <a:endParaRPr lang="en-US"/>
           </a:p>
@@ -445,7 +445,7 @@
           <a:p>
             <a:fld id="{CF2D4251-BB2D-49C1-B5CD-24763424ED1F}" type="datetimeFigureOut">
               <a:rPr lang="en-US" smtClean="0"/>
-              <a:t>2020-04-26</a:t>
+              <a:t>2020-05-05</a:t>
             </a:fld>
             <a:endParaRPr lang="en-US"/>
           </a:p>
@@ -625,7 +625,7 @@
           <a:p>
             <a:fld id="{CF2D4251-BB2D-49C1-B5CD-24763424ED1F}" type="datetimeFigureOut">
               <a:rPr lang="en-US" smtClean="0"/>
-              <a:t>2020-04-26</a:t>
+              <a:t>2020-05-05</a:t>
             </a:fld>
             <a:endParaRPr lang="en-US"/>
           </a:p>
@@ -795,7 +795,7 @@
           <a:p>
             <a:fld id="{CF2D4251-BB2D-49C1-B5CD-24763424ED1F}" type="datetimeFigureOut">
               <a:rPr lang="en-US" smtClean="0"/>
-              <a:t>2020-04-26</a:t>
+              <a:t>2020-05-05</a:t>
             </a:fld>
             <a:endParaRPr lang="en-US"/>
           </a:p>
@@ -1055,7 +1055,7 @@
           <a:p>
             <a:fld id="{CF2D4251-BB2D-49C1-B5CD-24763424ED1F}" type="datetimeFigureOut">
               <a:rPr lang="en-US" smtClean="0"/>
-              <a:t>2020-04-26</a:t>
+              <a:t>2020-05-05</a:t>
             </a:fld>
             <a:endParaRPr lang="en-US"/>
           </a:p>
@@ -1287,7 +1287,7 @@
           <a:p>
             <a:fld id="{CF2D4251-BB2D-49C1-B5CD-24763424ED1F}" type="datetimeFigureOut">
               <a:rPr lang="en-US" smtClean="0"/>
-              <a:t>2020-04-26</a:t>
+              <a:t>2020-05-05</a:t>
             </a:fld>
             <a:endParaRPr lang="en-US"/>
           </a:p>
@@ -1642,7 +1642,7 @@
           <a:p>
             <a:fld id="{CF2D4251-BB2D-49C1-B5CD-24763424ED1F}" type="datetimeFigureOut">
               <a:rPr lang="en-US" smtClean="0"/>
-              <a:t>2020-04-26</a:t>
+              <a:t>2020-05-05</a:t>
             </a:fld>
             <a:endParaRPr lang="en-US"/>
           </a:p>
@@ -1783,7 +1783,7 @@
           <a:p>
             <a:fld id="{CF2D4251-BB2D-49C1-B5CD-24763424ED1F}" type="datetimeFigureOut">
               <a:rPr lang="en-US" smtClean="0"/>
-              <a:t>2020-04-26</a:t>
+              <a:t>2020-05-05</a:t>
             </a:fld>
             <a:endParaRPr lang="en-US"/>
           </a:p>
@@ -1878,7 +1878,7 @@
           <a:p>
             <a:fld id="{CF2D4251-BB2D-49C1-B5CD-24763424ED1F}" type="datetimeFigureOut">
               <a:rPr lang="en-US" smtClean="0"/>
-              <a:t>2020-04-26</a:t>
+              <a:t>2020-05-05</a:t>
             </a:fld>
             <a:endParaRPr lang="en-US"/>
           </a:p>
@@ -2235,7 +2235,7 @@
           <a:p>
             <a:fld id="{CF2D4251-BB2D-49C1-B5CD-24763424ED1F}" type="datetimeFigureOut">
               <a:rPr lang="en-US" smtClean="0"/>
-              <a:t>2020-04-26</a:t>
+              <a:t>2020-05-05</a:t>
             </a:fld>
             <a:endParaRPr lang="en-US"/>
           </a:p>
@@ -2553,7 +2553,7 @@
           <a:p>
             <a:fld id="{CF2D4251-BB2D-49C1-B5CD-24763424ED1F}" type="datetimeFigureOut">
               <a:rPr lang="en-US" smtClean="0"/>
-              <a:t>2020-04-26</a:t>
+              <a:t>2020-05-05</a:t>
             </a:fld>
             <a:endParaRPr lang="en-US"/>
           </a:p>
@@ -2798,7 +2798,7 @@
           <a:p>
             <a:fld id="{CF2D4251-BB2D-49C1-B5CD-24763424ED1F}" type="datetimeFigureOut">
               <a:rPr lang="en-US" smtClean="0"/>
-              <a:t>2020-04-26</a:t>
+              <a:t>2020-05-05</a:t>
             </a:fld>
             <a:endParaRPr lang="en-US"/>
           </a:p>
@@ -3405,7 +3405,12 @@
             <p:ph type="title"/>
           </p:nvPr>
         </p:nvSpPr>
-        <p:spPr/>
+        <p:spPr>
+          <a:xfrm>
+            <a:off x="2231136" y="731520"/>
+            <a:ext cx="7729728" cy="1188720"/>
+          </a:xfrm>
+        </p:spPr>
         <p:txBody>
           <a:bodyPr/>
           <a:lstStyle/>
@@ -3437,7 +3442,7 @@
             </p:nvSpPr>
             <p:spPr>
               <a:xfrm>
-                <a:off x="2231136" y="2638044"/>
+                <a:off x="2231136" y="2286000"/>
                 <a:ext cx="7729728" cy="3896980"/>
               </a:xfrm>
             </p:spPr>
@@ -4192,7 +4197,7 @@
             </p:nvSpPr>
             <p:spPr>
               <a:xfrm>
-                <a:off x="2231136" y="2638044"/>
+                <a:off x="2231136" y="2286000"/>
                 <a:ext cx="7729728" cy="3896980"/>
               </a:xfrm>
               <a:blipFill>
@@ -4263,7 +4268,12 @@
             <p:ph type="title"/>
           </p:nvPr>
         </p:nvSpPr>
-        <p:spPr/>
+        <p:spPr>
+          <a:xfrm>
+            <a:off x="2231136" y="731520"/>
+            <a:ext cx="7729728" cy="1188720"/>
+          </a:xfrm>
+        </p:spPr>
         <p:txBody>
           <a:bodyPr/>
           <a:lstStyle/>
@@ -4291,7 +4301,12 @@
             <p:ph idx="1"/>
           </p:nvPr>
         </p:nvSpPr>
-        <p:spPr/>
+        <p:spPr>
+          <a:xfrm>
+            <a:off x="2231136" y="2638044"/>
+            <a:ext cx="9503840" cy="3101983"/>
+          </a:xfrm>
+        </p:spPr>
         <p:txBody>
           <a:bodyPr>
             <a:normAutofit/>
@@ -4396,8 +4411,8 @@
         </p:blipFill>
         <p:spPr>
           <a:xfrm>
-            <a:off x="457024" y="2680309"/>
-            <a:ext cx="7150568" cy="3544350"/>
+            <a:off x="457024" y="2200735"/>
+            <a:ext cx="8913480" cy="4418179"/>
           </a:xfrm>
           <a:prstGeom prst="rect">
             <a:avLst/>
@@ -4450,7 +4465,12 @@
             <p:ph type="title"/>
           </p:nvPr>
         </p:nvSpPr>
-        <p:spPr/>
+        <p:spPr>
+          <a:xfrm>
+            <a:off x="2209103" y="731520"/>
+            <a:ext cx="7729728" cy="1188720"/>
+          </a:xfrm>
+        </p:spPr>
         <p:txBody>
           <a:bodyPr/>
           <a:lstStyle/>
@@ -4480,13 +4500,13 @@
         </p:nvSpPr>
         <p:spPr>
           <a:xfrm>
-            <a:off x="855677" y="2638044"/>
-            <a:ext cx="9105188" cy="3938925"/>
+            <a:off x="2231137" y="2286000"/>
+            <a:ext cx="7729728" cy="3938925"/>
           </a:xfrm>
         </p:spPr>
         <p:txBody>
           <a:bodyPr>
-            <a:normAutofit/>
+            <a:normAutofit fontScale="92500" lnSpcReduction="10000"/>
           </a:bodyPr>
           <a:lstStyle/>
           <a:p>
@@ -4546,12 +4566,20 @@
             </a:endParaRPr>
           </a:p>
           <a:p>
-            <a:pPr marL="342900" indent="-342900" algn="r" rtl="1">
-              <a:buFont typeface="+mj-lt"/>
-              <a:buAutoNum type="arabicParenR"/>
+            <a:pPr marL="0" indent="0" algn="r" rtl="1">
+              <a:buNone/>
             </a:pPr>
             <a:r>
               <a:rPr lang="fa-IR" sz="2600" dirty="0">
+                <a:solidFill>
+                  <a:schemeClr val="accent2"/>
+                </a:solidFill>
+                <a:cs typeface="B Nazanin" panose="00000400000000000000" pitchFamily="2" charset="-78"/>
+              </a:rPr>
+              <a:t>۱) </a:t>
+            </a:r>
+            <a:r>
+              <a:rPr lang="fa-IR" sz="2600" dirty="0">
                 <a:cs typeface="B Nazanin" panose="00000400000000000000" pitchFamily="2" charset="-78"/>
               </a:rPr>
               <a:t>خود </a:t>
@@ -4598,23 +4626,28 @@
               </a:rPr>
               <a:t>می‌شود</a:t>
             </a:r>
+            <a:endParaRPr lang="fa-IR" sz="2600" dirty="0">
+              <a:cs typeface="B Nazanin" panose="00000400000000000000" pitchFamily="2" charset="-78"/>
+            </a:endParaRPr>
+          </a:p>
+          <a:p>
+            <a:pPr marL="0" indent="0" algn="r" rtl="1">
+              <a:buNone/>
+            </a:pPr>
             <a:r>
               <a:rPr lang="fa-IR" sz="2600" dirty="0">
-                <a:cs typeface="B Nazanin" panose="00000400000000000000" pitchFamily="2" charset="-78"/>
-              </a:rPr>
-              <a:t> </a:t>
-            </a:r>
-          </a:p>
-          <a:p>
-            <a:pPr marL="342900" indent="-342900" algn="r" rtl="1">
-              <a:buFont typeface="+mj-lt"/>
-              <a:buAutoNum type="arabicParenR"/>
-            </a:pPr>
+                <a:solidFill>
+                  <a:schemeClr val="accent2"/>
+                </a:solidFill>
+                <a:cs typeface="B Nazanin" panose="00000400000000000000" pitchFamily="2" charset="-78"/>
+              </a:rPr>
+              <a:t>۲)</a:t>
+            </a:r>
             <a:r>
               <a:rPr lang="fa-IR" sz="2600" dirty="0">
                 <a:cs typeface="B Nazanin" panose="00000400000000000000" pitchFamily="2" charset="-78"/>
               </a:rPr>
-              <a:t>استخراج قسمت </a:t>
+              <a:t> استخراج قسمت </a:t>
             </a:r>
             <a:r>
               <a:rPr lang="en-US" sz="2600" dirty="0">
@@ -4893,7 +4926,12 @@
             <p:ph type="title"/>
           </p:nvPr>
         </p:nvSpPr>
-        <p:spPr/>
+        <p:spPr>
+          <a:xfrm>
+            <a:off x="2212848" y="731520"/>
+            <a:ext cx="7729728" cy="1188720"/>
+          </a:xfrm>
+        </p:spPr>
         <p:txBody>
           <a:bodyPr/>
           <a:lstStyle/>
@@ -4907,10 +4945,10 @@
       </p:sp>
       <p:pic>
         <p:nvPicPr>
-          <p:cNvPr id="9" name="Content Placeholder 8">
+          <p:cNvPr id="6" name="Content Placeholder 5">
             <a:extLst>
               <a:ext uri="{FF2B5EF4-FFF2-40B4-BE49-F238E27FC236}">
-                <a16:creationId xmlns:a16="http://schemas.microsoft.com/office/drawing/2014/main" id="{65E72DF7-6678-46CD-BBA7-20A87CF2DEB6}"/>
+                <a16:creationId xmlns:a16="http://schemas.microsoft.com/office/drawing/2014/main" id="{83A4C035-ED99-498E-9C4F-3DEDAAAA81C5}"/>
               </a:ext>
             </a:extLst>
           </p:cNvPr>
@@ -4938,8 +4976,8 @@
         </p:blipFill>
         <p:spPr>
           <a:xfrm>
-            <a:off x="1224653" y="1986652"/>
-            <a:ext cx="9742694" cy="4871348"/>
+            <a:off x="1055992" y="1669410"/>
+            <a:ext cx="10080016" cy="5040006"/>
           </a:xfrm>
         </p:spPr>
       </p:pic>
@@ -4989,7 +5027,12 @@
             <p:ph type="title"/>
           </p:nvPr>
         </p:nvSpPr>
-        <p:spPr/>
+        <p:spPr>
+          <a:xfrm>
+            <a:off x="2212848" y="731520"/>
+            <a:ext cx="7729728" cy="1188720"/>
+          </a:xfrm>
+        </p:spPr>
         <p:txBody>
           <a:bodyPr/>
           <a:lstStyle/>
@@ -5019,7 +5062,7 @@
         </p:nvSpPr>
         <p:spPr>
           <a:xfrm>
-            <a:off x="2231136" y="2638044"/>
+            <a:off x="2231136" y="2286000"/>
             <a:ext cx="7729728" cy="3670477"/>
           </a:xfrm>
         </p:spPr>
@@ -5029,10 +5072,18 @@
           </a:bodyPr>
           <a:lstStyle/>
           <a:p>
-            <a:pPr marL="342900" indent="-342900" algn="r" rtl="1">
-              <a:buFont typeface="+mj-lt"/>
-              <a:buAutoNum type="arabicParenR" startAt="3"/>
+            <a:pPr marL="0" indent="0" algn="r" rtl="1">
+              <a:buNone/>
             </a:pPr>
+            <a:r>
+              <a:rPr lang="fa-IR" sz="2800" dirty="0">
+                <a:solidFill>
+                  <a:schemeClr val="accent2"/>
+                </a:solidFill>
+                <a:cs typeface="B Nazanin" panose="00000400000000000000" pitchFamily="2" charset="-78"/>
+              </a:rPr>
+              <a:t>۳) </a:t>
+            </a:r>
             <a:r>
               <a:rPr lang="fa-IR" sz="2800" dirty="0">
                 <a:cs typeface="B Nazanin" panose="00000400000000000000" pitchFamily="2" charset="-78"/>
@@ -5143,18 +5194,26 @@
             </a:endParaRPr>
           </a:p>
           <a:p>
-            <a:pPr marL="342900" indent="-342900" algn="r" rtl="1">
+            <a:pPr marL="0" indent="0" algn="r" rtl="1">
               <a:spcBef>
                 <a:spcPts val="3000"/>
               </a:spcBef>
-              <a:buFont typeface="+mj-lt"/>
-              <a:buAutoNum type="arabicParenR" startAt="4"/>
+              <a:buNone/>
             </a:pPr>
             <a:r>
               <a:rPr lang="fa-IR" sz="2800" dirty="0">
-                <a:cs typeface="B Nazanin" panose="00000400000000000000" pitchFamily="2" charset="-78"/>
-              </a:rPr>
-              <a:t>به دست آوردن بخش </a:t>
+                <a:solidFill>
+                  <a:schemeClr val="accent2"/>
+                </a:solidFill>
+                <a:cs typeface="B Nazanin" panose="00000400000000000000" pitchFamily="2" charset="-78"/>
+              </a:rPr>
+              <a:t>۴)</a:t>
+            </a:r>
+            <a:r>
+              <a:rPr lang="fa-IR" sz="2800" dirty="0">
+                <a:cs typeface="B Nazanin" panose="00000400000000000000" pitchFamily="2" charset="-78"/>
+              </a:rPr>
+              <a:t> به دست آوردن بخش </a:t>
             </a:r>
             <a:r>
               <a:rPr lang="en-US" sz="2800" dirty="0">
@@ -5178,7 +5237,7 @@
               <a:rPr lang="fa-IR" sz="2800" dirty="0">
                 <a:cs typeface="B Nazanin" panose="00000400000000000000" pitchFamily="2" charset="-78"/>
               </a:rPr>
-              <a:t>؛</a:t>
+              <a:t>:</a:t>
             </a:r>
           </a:p>
           <a:p>
@@ -5313,7 +5372,12 @@
             <p:ph type="title"/>
           </p:nvPr>
         </p:nvSpPr>
-        <p:spPr/>
+        <p:spPr>
+          <a:xfrm>
+            <a:off x="2212848" y="731520"/>
+            <a:ext cx="7729728" cy="1188720"/>
+          </a:xfrm>
+        </p:spPr>
         <p:txBody>
           <a:bodyPr/>
           <a:lstStyle/>
@@ -5341,7 +5405,12 @@
             <p:ph idx="1"/>
           </p:nvPr>
         </p:nvSpPr>
-        <p:spPr/>
+        <p:spPr>
+          <a:xfrm>
+            <a:off x="2231136" y="2286000"/>
+            <a:ext cx="7729728" cy="3101983"/>
+          </a:xfrm>
+        </p:spPr>
         <p:txBody>
           <a:bodyPr>
             <a:normAutofit lnSpcReduction="10000"/>
@@ -5563,7 +5632,12 @@
             <p:ph type="title"/>
           </p:nvPr>
         </p:nvSpPr>
-        <p:spPr/>
+        <p:spPr>
+          <a:xfrm>
+            <a:off x="2212848" y="731520"/>
+            <a:ext cx="7729728" cy="1188720"/>
+          </a:xfrm>
+        </p:spPr>
         <p:txBody>
           <a:bodyPr/>
           <a:lstStyle/>
@@ -5593,7 +5667,7 @@
         </p:nvSpPr>
         <p:spPr>
           <a:xfrm>
-            <a:off x="2231136" y="2638044"/>
+            <a:off x="2231136" y="2286000"/>
             <a:ext cx="7729728" cy="4140261"/>
           </a:xfrm>
         </p:spPr>
@@ -5779,6 +5853,47 @@
           <a:chExt cx="0" cy="0"/>
         </a:xfrm>
       </p:grpSpPr>
+      <p:sp>
+        <p:nvSpPr>
+          <p:cNvPr id="2" name="TextBox 1">
+            <a:extLst>
+              <a:ext uri="{FF2B5EF4-FFF2-40B4-BE49-F238E27FC236}">
+                <a16:creationId xmlns:a16="http://schemas.microsoft.com/office/drawing/2014/main" id="{4895426F-1353-41F3-9164-E97F85112A41}"/>
+              </a:ext>
+            </a:extLst>
+          </p:cNvPr>
+          <p:cNvSpPr txBox="1"/>
+          <p:nvPr/>
+        </p:nvSpPr>
+        <p:spPr>
+          <a:xfrm>
+            <a:off x="3194179" y="2921168"/>
+            <a:ext cx="5803641" cy="1015663"/>
+          </a:xfrm>
+          <a:prstGeom prst="rect">
+            <a:avLst/>
+          </a:prstGeom>
+          <a:noFill/>
+        </p:spPr>
+        <p:txBody>
+          <a:bodyPr wrap="square" rtlCol="0">
+            <a:spAutoFit/>
+          </a:bodyPr>
+          <a:lstStyle/>
+          <a:p>
+            <a:pPr algn="ctr"/>
+            <a:r>
+              <a:rPr lang="fa-IR" sz="6000" dirty="0">
+                <a:cs typeface="B Nazanin" panose="00000400000000000000" pitchFamily="2" charset="-78"/>
+              </a:rPr>
+              <a:t> با تشکر</a:t>
+            </a:r>
+            <a:endParaRPr lang="en-US" sz="6000" dirty="0">
+              <a:cs typeface="B Nazanin" panose="00000400000000000000" pitchFamily="2" charset="-78"/>
+            </a:endParaRPr>
+          </a:p>
+        </p:txBody>
+      </p:sp>
     </p:spTree>
     <p:extLst>
       <p:ext uri="{BB962C8B-B14F-4D97-AF65-F5344CB8AC3E}">

</xml_diff>